<commit_message>
beautified rev ob arch
</commit_message>
<xml_diff>
--- a/research/revised-open-banking-architecture.pptx
+++ b/research/revised-open-banking-architecture.pptx
@@ -3311,8 +3311,8 @@
         </p:nvSpPr>
         <p:spPr>
           <a:xfrm>
-            <a:off x="979246" y="3808588"/>
-            <a:ext cx="4511743" cy="749143"/>
+            <a:off x="624537" y="3808588"/>
+            <a:ext cx="5019977" cy="749143"/>
           </a:xfrm>
           <a:prstGeom prst="roundRect">
             <a:avLst/>
@@ -3447,7 +3447,7 @@
         <p:spPr>
           <a:xfrm>
             <a:off x="306413" y="2258036"/>
-            <a:ext cx="5688632" cy="2728872"/>
+            <a:ext cx="5652226" cy="2728872"/>
           </a:xfrm>
           <a:prstGeom prst="roundRect">
             <a:avLst>
@@ -5781,7 +5781,9 @@
             <a:ext cx="1206178" cy="1055608"/>
           </a:xfrm>
           <a:prstGeom prst="roundRect">
-            <a:avLst/>
+            <a:avLst>
+              <a:gd name="adj" fmla="val 14957"/>
+            </a:avLst>
           </a:prstGeom>
           <a:gradFill>
             <a:gsLst>
@@ -6209,8 +6211,8 @@
         </p:nvSpPr>
         <p:spPr>
           <a:xfrm>
-            <a:off x="7731375" y="4996064"/>
-            <a:ext cx="1090363" cy="246221"/>
+            <a:off x="7391538" y="4996064"/>
+            <a:ext cx="1430200" cy="246221"/>
           </a:xfrm>
           <a:prstGeom prst="rect">
             <a:avLst/>
@@ -6230,7 +6232,7 @@
             </a:r>
             <a:r>
               <a:rPr lang="en-US" sz="1000" dirty="0"/>
-              <a:t> 2024</a:t>
+              <a:t> 2024-01-01</a:t>
             </a:r>
           </a:p>
         </p:txBody>

</xml_diff>

<commit_message>
really minor text update
</commit_message>
<xml_diff>
--- a/research/revised-open-banking-architecture.pptx
+++ b/research/revised-open-banking-architecture.pptx
@@ -302,7 +302,7 @@
           <a:p>
             <a:fld id="{FE398CD6-77FF-42E1-B299-E17665EBA674}" type="datetimeFigureOut">
               <a:rPr lang="en-US" smtClean="0"/>
-              <a:t>2024-01-05</a:t>
+              <a:t>2024-01-15</a:t>
             </a:fld>
             <a:endParaRPr lang="en-US"/>
           </a:p>
@@ -470,7 +470,7 @@
           <a:p>
             <a:fld id="{FE398CD6-77FF-42E1-B299-E17665EBA674}" type="datetimeFigureOut">
               <a:rPr lang="en-US" smtClean="0"/>
-              <a:t>2024-01-05</a:t>
+              <a:t>2024-01-15</a:t>
             </a:fld>
             <a:endParaRPr lang="en-US"/>
           </a:p>
@@ -648,7 +648,7 @@
           <a:p>
             <a:fld id="{FE398CD6-77FF-42E1-B299-E17665EBA674}" type="datetimeFigureOut">
               <a:rPr lang="en-US" smtClean="0"/>
-              <a:t>2024-01-05</a:t>
+              <a:t>2024-01-15</a:t>
             </a:fld>
             <a:endParaRPr lang="en-US"/>
           </a:p>
@@ -816,7 +816,7 @@
           <a:p>
             <a:fld id="{FE398CD6-77FF-42E1-B299-E17665EBA674}" type="datetimeFigureOut">
               <a:rPr lang="en-US" smtClean="0"/>
-              <a:t>2024-01-05</a:t>
+              <a:t>2024-01-15</a:t>
             </a:fld>
             <a:endParaRPr lang="en-US"/>
           </a:p>
@@ -1061,7 +1061,7 @@
           <a:p>
             <a:fld id="{FE398CD6-77FF-42E1-B299-E17665EBA674}" type="datetimeFigureOut">
               <a:rPr lang="en-US" smtClean="0"/>
-              <a:t>2024-01-05</a:t>
+              <a:t>2024-01-15</a:t>
             </a:fld>
             <a:endParaRPr lang="en-US"/>
           </a:p>
@@ -1346,7 +1346,7 @@
           <a:p>
             <a:fld id="{FE398CD6-77FF-42E1-B299-E17665EBA674}" type="datetimeFigureOut">
               <a:rPr lang="en-US" smtClean="0"/>
-              <a:t>2024-01-05</a:t>
+              <a:t>2024-01-15</a:t>
             </a:fld>
             <a:endParaRPr lang="en-US"/>
           </a:p>
@@ -1765,7 +1765,7 @@
           <a:p>
             <a:fld id="{FE398CD6-77FF-42E1-B299-E17665EBA674}" type="datetimeFigureOut">
               <a:rPr lang="en-US" smtClean="0"/>
-              <a:t>2024-01-05</a:t>
+              <a:t>2024-01-15</a:t>
             </a:fld>
             <a:endParaRPr lang="en-US"/>
           </a:p>
@@ -1882,7 +1882,7 @@
           <a:p>
             <a:fld id="{FE398CD6-77FF-42E1-B299-E17665EBA674}" type="datetimeFigureOut">
               <a:rPr lang="en-US" smtClean="0"/>
-              <a:t>2024-01-05</a:t>
+              <a:t>2024-01-15</a:t>
             </a:fld>
             <a:endParaRPr lang="en-US"/>
           </a:p>
@@ -1977,7 +1977,7 @@
           <a:p>
             <a:fld id="{FE398CD6-77FF-42E1-B299-E17665EBA674}" type="datetimeFigureOut">
               <a:rPr lang="en-US" smtClean="0"/>
-              <a:t>2024-01-05</a:t>
+              <a:t>2024-01-15</a:t>
             </a:fld>
             <a:endParaRPr lang="en-US"/>
           </a:p>
@@ -2252,7 +2252,7 @@
           <a:p>
             <a:fld id="{FE398CD6-77FF-42E1-B299-E17665EBA674}" type="datetimeFigureOut">
               <a:rPr lang="en-US" smtClean="0"/>
-              <a:t>2024-01-05</a:t>
+              <a:t>2024-01-15</a:t>
             </a:fld>
             <a:endParaRPr lang="en-US"/>
           </a:p>
@@ -2504,7 +2504,7 @@
           <a:p>
             <a:fld id="{FE398CD6-77FF-42E1-B299-E17665EBA674}" type="datetimeFigureOut">
               <a:rPr lang="en-US" smtClean="0"/>
-              <a:t>2024-01-05</a:t>
+              <a:t>2024-01-15</a:t>
             </a:fld>
             <a:endParaRPr lang="en-US"/>
           </a:p>
@@ -2715,7 +2715,7 @@
           <a:p>
             <a:fld id="{FE398CD6-77FF-42E1-B299-E17665EBA674}" type="datetimeFigureOut">
               <a:rPr lang="en-US" smtClean="0"/>
-              <a:t>2024-01-05</a:t>
+              <a:t>2024-01-15</a:t>
             </a:fld>
             <a:endParaRPr lang="en-US"/>
           </a:p>
@@ -4755,7 +4755,7 @@
                 <a:latin typeface="Arial" panose="020B0604020202020204" pitchFamily="34" charset="0"/>
                 <a:cs typeface="Arial" panose="020B0604020202020204" pitchFamily="34" charset="0"/>
               </a:rPr>
-              <a:t>Proprietary and/or standardized</a:t>
+              <a:t>Proprietary or standardized</a:t>
             </a:r>
           </a:p>
           <a:p>
@@ -4903,7 +4903,7 @@
         </p:nvSpPr>
         <p:spPr>
           <a:xfrm>
-            <a:off x="6288686" y="2872794"/>
+            <a:off x="6288686" y="3123689"/>
             <a:ext cx="2622834" cy="2177519"/>
           </a:xfrm>
           <a:prstGeom prst="rect">
@@ -6005,7 +6005,7 @@
         </p:nvSpPr>
         <p:spPr>
           <a:xfrm>
-            <a:off x="6811155" y="5464739"/>
+            <a:off x="6811155" y="5502689"/>
             <a:ext cx="222515" cy="298521"/>
           </a:xfrm>
           <a:prstGeom prst="downArrow">
@@ -6076,7 +6076,7 @@
         </p:nvSpPr>
         <p:spPr>
           <a:xfrm>
-            <a:off x="7033670" y="5440186"/>
+            <a:off x="7033670" y="5478136"/>
             <a:ext cx="1746634" cy="327128"/>
           </a:xfrm>
           <a:prstGeom prst="rect">

</xml_diff>